<commit_message>
Illustration for falling with drag improved
</commit_message>
<xml_diff>
--- a/images/falling_with_drag/illustration.pptx
+++ b/images/falling_with_drag/illustration.pptx
@@ -104,6 +104,11 @@
       </a:defRPr>
     </a:lvl9pPr>
   </p:defaultTextStyle>
+  <p:extLst>
+    <p:ext uri="{EFAFB233-063F-42B5-8137-9DF3F51BA10A}">
+      <p15:sldGuideLst xmlns:p15="http://schemas.microsoft.com/office/powerpoint/2012/main"/>
+    </p:ext>
+  </p:extLst>
 </p:presentation>
 </file>
 
@@ -3053,6 +3058,7 @@
             <a:solidFill>
               <a:schemeClr val="tx1"/>
             </a:solidFill>
+            <a:headEnd type="triangle"/>
             <a:tailEnd type="triangle"/>
           </a:ln>
         </p:spPr>

</xml_diff>

<commit_message>
Falling with drag updated
</commit_message>
<xml_diff>
--- a/images/falling_with_drag/illustration.pptx
+++ b/images/falling_with_drag/illustration.pptx
@@ -247,7 +247,7 @@
           <a:p>
             <a:fld id="{7080BB79-ADC7-4FBF-8D1A-5D577821D2D2}" type="datetimeFigureOut">
               <a:rPr lang="pt-BR" smtClean="0"/>
-              <a:t>09/12/2017</a:t>
+              <a:t>11/12/2017</a:t>
             </a:fld>
             <a:endParaRPr lang="pt-BR"/>
           </a:p>
@@ -417,7 +417,7 @@
           <a:p>
             <a:fld id="{7080BB79-ADC7-4FBF-8D1A-5D577821D2D2}" type="datetimeFigureOut">
               <a:rPr lang="pt-BR" smtClean="0"/>
-              <a:t>09/12/2017</a:t>
+              <a:t>11/12/2017</a:t>
             </a:fld>
             <a:endParaRPr lang="pt-BR"/>
           </a:p>
@@ -597,7 +597,7 @@
           <a:p>
             <a:fld id="{7080BB79-ADC7-4FBF-8D1A-5D577821D2D2}" type="datetimeFigureOut">
               <a:rPr lang="pt-BR" smtClean="0"/>
-              <a:t>09/12/2017</a:t>
+              <a:t>11/12/2017</a:t>
             </a:fld>
             <a:endParaRPr lang="pt-BR"/>
           </a:p>
@@ -767,7 +767,7 @@
           <a:p>
             <a:fld id="{7080BB79-ADC7-4FBF-8D1A-5D577821D2D2}" type="datetimeFigureOut">
               <a:rPr lang="pt-BR" smtClean="0"/>
-              <a:t>09/12/2017</a:t>
+              <a:t>11/12/2017</a:t>
             </a:fld>
             <a:endParaRPr lang="pt-BR"/>
           </a:p>
@@ -1011,7 +1011,7 @@
           <a:p>
             <a:fld id="{7080BB79-ADC7-4FBF-8D1A-5D577821D2D2}" type="datetimeFigureOut">
               <a:rPr lang="pt-BR" smtClean="0"/>
-              <a:t>09/12/2017</a:t>
+              <a:t>11/12/2017</a:t>
             </a:fld>
             <a:endParaRPr lang="pt-BR"/>
           </a:p>
@@ -1243,7 +1243,7 @@
           <a:p>
             <a:fld id="{7080BB79-ADC7-4FBF-8D1A-5D577821D2D2}" type="datetimeFigureOut">
               <a:rPr lang="pt-BR" smtClean="0"/>
-              <a:t>09/12/2017</a:t>
+              <a:t>11/12/2017</a:t>
             </a:fld>
             <a:endParaRPr lang="pt-BR"/>
           </a:p>
@@ -1610,7 +1610,7 @@
           <a:p>
             <a:fld id="{7080BB79-ADC7-4FBF-8D1A-5D577821D2D2}" type="datetimeFigureOut">
               <a:rPr lang="pt-BR" smtClean="0"/>
-              <a:t>09/12/2017</a:t>
+              <a:t>11/12/2017</a:t>
             </a:fld>
             <a:endParaRPr lang="pt-BR"/>
           </a:p>
@@ -1728,7 +1728,7 @@
           <a:p>
             <a:fld id="{7080BB79-ADC7-4FBF-8D1A-5D577821D2D2}" type="datetimeFigureOut">
               <a:rPr lang="pt-BR" smtClean="0"/>
-              <a:t>09/12/2017</a:t>
+              <a:t>11/12/2017</a:t>
             </a:fld>
             <a:endParaRPr lang="pt-BR"/>
           </a:p>
@@ -1823,7 +1823,7 @@
           <a:p>
             <a:fld id="{7080BB79-ADC7-4FBF-8D1A-5D577821D2D2}" type="datetimeFigureOut">
               <a:rPr lang="pt-BR" smtClean="0"/>
-              <a:t>09/12/2017</a:t>
+              <a:t>11/12/2017</a:t>
             </a:fld>
             <a:endParaRPr lang="pt-BR"/>
           </a:p>
@@ -2100,7 +2100,7 @@
           <a:p>
             <a:fld id="{7080BB79-ADC7-4FBF-8D1A-5D577821D2D2}" type="datetimeFigureOut">
               <a:rPr lang="pt-BR" smtClean="0"/>
-              <a:t>09/12/2017</a:t>
+              <a:t>11/12/2017</a:t>
             </a:fld>
             <a:endParaRPr lang="pt-BR"/>
           </a:p>
@@ -2357,7 +2357,7 @@
           <a:p>
             <a:fld id="{7080BB79-ADC7-4FBF-8D1A-5D577821D2D2}" type="datetimeFigureOut">
               <a:rPr lang="pt-BR" smtClean="0"/>
-              <a:t>09/12/2017</a:t>
+              <a:t>11/12/2017</a:t>
             </a:fld>
             <a:endParaRPr lang="pt-BR"/>
           </a:p>
@@ -2570,7 +2570,7 @@
           <a:p>
             <a:fld id="{7080BB79-ADC7-4FBF-8D1A-5D577821D2D2}" type="datetimeFigureOut">
               <a:rPr lang="pt-BR" smtClean="0"/>
-              <a:t>09/12/2017</a:t>
+              <a:t>11/12/2017</a:t>
             </a:fld>
             <a:endParaRPr lang="pt-BR"/>
           </a:p>
@@ -2961,6 +2961,14 @@
 <file path=ppt/slides/slide1.xml><?xml version="1.0" encoding="utf-8"?>
 <p:sld xmlns:a="http://schemas.openxmlformats.org/drawingml/2006/main" xmlns:r="http://schemas.openxmlformats.org/officeDocument/2006/relationships" xmlns:p="http://schemas.openxmlformats.org/presentationml/2006/main">
   <p:cSld>
+    <p:bg>
+      <p:bgPr>
+        <a:solidFill>
+          <a:schemeClr val="bg1"/>
+        </a:solidFill>
+        <a:effectLst/>
+      </p:bgPr>
+    </p:bg>
     <p:spTree>
       <p:nvGrpSpPr>
         <p:cNvPr id="1" name=""/>
@@ -2995,7 +3003,9 @@
           <a:prstGeom prst="ellipse">
             <a:avLst/>
           </a:prstGeom>
-          <a:noFill/>
+          <a:solidFill>
+            <a:schemeClr val="bg1"/>
+          </a:solidFill>
           <a:ln w="63500">
             <a:solidFill>
               <a:srgbClr val="FF0000"/>
@@ -3029,6 +3039,60 @@
           <a:p>
             <a:pPr algn="ctr"/>
             <a:endParaRPr lang="pt-BR" sz="1975"/>
+          </a:p>
+        </p:txBody>
+      </p:sp>
+      <p:sp>
+        <p:nvSpPr>
+          <p:cNvPr id="2" name="Retângulo 1">
+            <a:extLst>
+              <a:ext uri="{FF2B5EF4-FFF2-40B4-BE49-F238E27FC236}">
+                <a16:creationId xmlns:a16="http://schemas.microsoft.com/office/drawing/2014/main" id="{5493CEF3-C47F-461C-9075-C09796C9F963}"/>
+              </a:ext>
+            </a:extLst>
+          </p:cNvPr>
+          <p:cNvSpPr/>
+          <p:nvPr/>
+        </p:nvSpPr>
+        <p:spPr>
+          <a:xfrm>
+            <a:off x="-78658" y="4873876"/>
+            <a:ext cx="5220929" cy="251146"/>
+          </a:xfrm>
+          <a:prstGeom prst="rect">
+            <a:avLst/>
+          </a:prstGeom>
+          <a:solidFill>
+            <a:schemeClr val="bg1"/>
+          </a:solidFill>
+          <a:ln>
+            <a:solidFill>
+              <a:schemeClr val="bg1"/>
+            </a:solidFill>
+          </a:ln>
+        </p:spPr>
+        <p:style>
+          <a:lnRef idx="2">
+            <a:schemeClr val="accent1">
+              <a:shade val="50000"/>
+            </a:schemeClr>
+          </a:lnRef>
+          <a:fillRef idx="1">
+            <a:schemeClr val="accent1"/>
+          </a:fillRef>
+          <a:effectRef idx="0">
+            <a:schemeClr val="accent1"/>
+          </a:effectRef>
+          <a:fontRef idx="minor">
+            <a:schemeClr val="lt1"/>
+          </a:fontRef>
+        </p:style>
+        <p:txBody>
+          <a:bodyPr rtlCol="0" anchor="ctr"/>
+          <a:lstStyle/>
+          <a:p>
+            <a:pPr algn="ctr"/>
+            <a:endParaRPr lang="pt-BR"/>
           </a:p>
         </p:txBody>
       </p:sp>
@@ -4430,7 +4494,9 @@
           </a:custGeom>
           <a:ln w="63500">
             <a:solidFill>
-              <a:schemeClr val="tx1"/>
+              <a:schemeClr val="bg1">
+                <a:lumMod val="65000"/>
+              </a:schemeClr>
             </a:solidFill>
           </a:ln>
         </p:spPr>
@@ -4532,7 +4598,9 @@
           </a:custGeom>
           <a:ln w="63500">
             <a:solidFill>
-              <a:schemeClr val="tx1"/>
+              <a:schemeClr val="bg1">
+                <a:lumMod val="65000"/>
+              </a:schemeClr>
             </a:solidFill>
           </a:ln>
         </p:spPr>
@@ -4634,7 +4702,9 @@
           </a:custGeom>
           <a:ln w="63500">
             <a:solidFill>
-              <a:schemeClr val="tx1"/>
+              <a:schemeClr val="bg1">
+                <a:lumMod val="65000"/>
+              </a:schemeClr>
             </a:solidFill>
           </a:ln>
         </p:spPr>
@@ -4736,7 +4806,9 @@
           </a:custGeom>
           <a:ln w="63500">
             <a:solidFill>
-              <a:schemeClr val="tx1"/>
+              <a:schemeClr val="bg1">
+                <a:lumMod val="65000"/>
+              </a:schemeClr>
             </a:solidFill>
           </a:ln>
         </p:spPr>
@@ -4838,7 +4910,9 @@
           </a:custGeom>
           <a:ln w="63500">
             <a:solidFill>
-              <a:schemeClr val="tx1"/>
+              <a:schemeClr val="bg1">
+                <a:lumMod val="65000"/>
+              </a:schemeClr>
             </a:solidFill>
           </a:ln>
         </p:spPr>
@@ -4940,7 +5014,9 @@
           </a:custGeom>
           <a:ln w="63500">
             <a:solidFill>
-              <a:schemeClr val="tx1"/>
+              <a:schemeClr val="bg1">
+                <a:lumMod val="65000"/>
+              </a:schemeClr>
             </a:solidFill>
           </a:ln>
         </p:spPr>

</xml_diff>